<commit_message>
#87 - reformatted home page of extended app
</commit_message>
<xml_diff>
--- a/adocs/documentation/src/main/asciidoc/_resources/module-dependencies.pptx
+++ b/adocs/documentation/src/main/asciidoc/_resources/module-dependencies.pptx
@@ -104,6 +104,11 @@
       </a:defRPr>
     </a:lvl9pPr>
   </p:defaultTextStyle>
+  <p:extLst>
+    <p:ext uri="{EFAFB233-063F-42B5-8137-9DF3F51BA10A}">
+      <p15:sldGuideLst xmlns:p15="http://schemas.microsoft.com/office/powerpoint/2012/main"/>
+    </p:ext>
+  </p:extLst>
 </p:presentation>
 </file>
 
@@ -256,7 +261,7 @@
           <a:p>
             <a:fld id="{3CD37E63-85AE-49AF-ADC8-B05819E3103C}" type="datetimeFigureOut">
               <a:rPr lang="en-GB" smtClean="0"/>
-              <a:t>24/06/2018</a:t>
+              <a:t>03/07/2018</a:t>
             </a:fld>
             <a:endParaRPr lang="en-GB"/>
           </a:p>
@@ -456,7 +461,7 @@
           <a:p>
             <a:fld id="{3CD37E63-85AE-49AF-ADC8-B05819E3103C}" type="datetimeFigureOut">
               <a:rPr lang="en-GB" smtClean="0"/>
-              <a:t>24/06/2018</a:t>
+              <a:t>03/07/2018</a:t>
             </a:fld>
             <a:endParaRPr lang="en-GB"/>
           </a:p>
@@ -666,7 +671,7 @@
           <a:p>
             <a:fld id="{3CD37E63-85AE-49AF-ADC8-B05819E3103C}" type="datetimeFigureOut">
               <a:rPr lang="en-GB" smtClean="0"/>
-              <a:t>24/06/2018</a:t>
+              <a:t>03/07/2018</a:t>
             </a:fld>
             <a:endParaRPr lang="en-GB"/>
           </a:p>
@@ -866,7 +871,7 @@
           <a:p>
             <a:fld id="{3CD37E63-85AE-49AF-ADC8-B05819E3103C}" type="datetimeFigureOut">
               <a:rPr lang="en-GB" smtClean="0"/>
-              <a:t>24/06/2018</a:t>
+              <a:t>03/07/2018</a:t>
             </a:fld>
             <a:endParaRPr lang="en-GB"/>
           </a:p>
@@ -1142,7 +1147,7 @@
           <a:p>
             <a:fld id="{3CD37E63-85AE-49AF-ADC8-B05819E3103C}" type="datetimeFigureOut">
               <a:rPr lang="en-GB" smtClean="0"/>
-              <a:t>24/06/2018</a:t>
+              <a:t>03/07/2018</a:t>
             </a:fld>
             <a:endParaRPr lang="en-GB"/>
           </a:p>
@@ -1410,7 +1415,7 @@
           <a:p>
             <a:fld id="{3CD37E63-85AE-49AF-ADC8-B05819E3103C}" type="datetimeFigureOut">
               <a:rPr lang="en-GB" smtClean="0"/>
-              <a:t>24/06/2018</a:t>
+              <a:t>03/07/2018</a:t>
             </a:fld>
             <a:endParaRPr lang="en-GB"/>
           </a:p>
@@ -1825,7 +1830,7 @@
           <a:p>
             <a:fld id="{3CD37E63-85AE-49AF-ADC8-B05819E3103C}" type="datetimeFigureOut">
               <a:rPr lang="en-GB" smtClean="0"/>
-              <a:t>24/06/2018</a:t>
+              <a:t>03/07/2018</a:t>
             </a:fld>
             <a:endParaRPr lang="en-GB"/>
           </a:p>
@@ -1967,7 +1972,7 @@
           <a:p>
             <a:fld id="{3CD37E63-85AE-49AF-ADC8-B05819E3103C}" type="datetimeFigureOut">
               <a:rPr lang="en-GB" smtClean="0"/>
-              <a:t>24/06/2018</a:t>
+              <a:t>03/07/2018</a:t>
             </a:fld>
             <a:endParaRPr lang="en-GB"/>
           </a:p>
@@ -2080,7 +2085,7 @@
           <a:p>
             <a:fld id="{3CD37E63-85AE-49AF-ADC8-B05819E3103C}" type="datetimeFigureOut">
               <a:rPr lang="en-GB" smtClean="0"/>
-              <a:t>24/06/2018</a:t>
+              <a:t>03/07/2018</a:t>
             </a:fld>
             <a:endParaRPr lang="en-GB"/>
           </a:p>
@@ -2393,7 +2398,7 @@
           <a:p>
             <a:fld id="{3CD37E63-85AE-49AF-ADC8-B05819E3103C}" type="datetimeFigureOut">
               <a:rPr lang="en-GB" smtClean="0"/>
-              <a:t>24/06/2018</a:t>
+              <a:t>03/07/2018</a:t>
             </a:fld>
             <a:endParaRPr lang="en-GB"/>
           </a:p>
@@ -2682,7 +2687,7 @@
           <a:p>
             <a:fld id="{3CD37E63-85AE-49AF-ADC8-B05819E3103C}" type="datetimeFigureOut">
               <a:rPr lang="en-GB" smtClean="0"/>
-              <a:t>24/06/2018</a:t>
+              <a:t>03/07/2018</a:t>
             </a:fld>
             <a:endParaRPr lang="en-GB"/>
           </a:p>
@@ -2925,7 +2930,7 @@
           <a:p>
             <a:fld id="{3CD37E63-85AE-49AF-ADC8-B05819E3103C}" type="datetimeFigureOut">
               <a:rPr lang="en-GB" smtClean="0"/>
-              <a:t>24/06/2018</a:t>
+              <a:t>03/07/2018</a:t>
             </a:fld>
             <a:endParaRPr lang="en-GB"/>
           </a:p>
@@ -3356,7 +3361,7 @@
         </p:nvSpPr>
         <p:spPr>
           <a:xfrm>
-            <a:off x="92990" y="196570"/>
+            <a:off x="92990" y="179792"/>
             <a:ext cx="11969857" cy="2582793"/>
           </a:xfrm>
           <a:prstGeom prst="rect">
@@ -4478,8 +4483,8 @@
         </p:nvSpPr>
         <p:spPr>
           <a:xfrm>
-            <a:off x="231443" y="4542352"/>
-            <a:ext cx="11670277" cy="358929"/>
+            <a:off x="290279" y="4559130"/>
+            <a:ext cx="11611441" cy="358929"/>
           </a:xfrm>
           <a:prstGeom prst="rect">
             <a:avLst/>
@@ -4528,8 +4533,8 @@
         </p:nvSpPr>
         <p:spPr>
           <a:xfrm>
-            <a:off x="231443" y="5077047"/>
-            <a:ext cx="11670277" cy="358929"/>
+            <a:off x="290279" y="5077047"/>
+            <a:ext cx="11611441" cy="358929"/>
           </a:xfrm>
           <a:prstGeom prst="rect">
             <a:avLst/>
@@ -4594,7 +4599,7 @@
           <a:p>
             <a:r>
               <a:rPr lang="en-GB" dirty="0"/>
-              <a:t>Dependencies point upwards.  Blue (prod code) doesn’t depend on green (test code)</a:t>
+              <a:t>Dependencies point upwards.  Prod code (blue) doesn’t depend on test code (green)</a:t>
             </a:r>
           </a:p>
         </p:txBody>

</xml_diff>